<commit_message>
Renamed SignatureConstants to Constants, and added a slide to the presentation.pdf
</commit_message>
<xml_diff>
--- a/cachet.pptx
+++ b/cachet.pptx
@@ -5,13 +5,14 @@
     <p:sldMasterId id="2147483648" r:id="rId1"/>
   </p:sldMasterIdLst>
   <p:notesMasterIdLst>
-    <p:notesMasterId r:id="rId6"/>
+    <p:notesMasterId r:id="rId7"/>
   </p:notesMasterIdLst>
   <p:sldIdLst>
     <p:sldId id="256" r:id="rId2"/>
     <p:sldId id="257" r:id="rId3"/>
     <p:sldId id="258" r:id="rId4"/>
     <p:sldId id="259" r:id="rId5"/>
+    <p:sldId id="260" r:id="rId6"/>
   </p:sldIdLst>
   <p:sldSz cx="12192000" cy="6858000"/>
   <p:notesSz cx="6858000" cy="9144000"/>
@@ -110,6 +111,11 @@
       </a:defRPr>
     </a:lvl9pPr>
   </p:defaultTextStyle>
+  <p:extLst>
+    <p:ext uri="{EFAFB233-063F-42B5-8137-9DF3F51BA10A}">
+      <p15:sldGuideLst xmlns:p15="http://schemas.microsoft.com/office/powerpoint/2012/main"/>
+    </p:ext>
+  </p:extLst>
 </p:presentation>
 </file>
 
@@ -3671,6 +3677,152 @@
 </p:notes>
 </file>
 
+<file path=ppt/notesSlides/notesSlide5.xml><?xml version="1.0" encoding="utf-8"?>
+<p:notes xmlns:a="http://schemas.openxmlformats.org/drawingml/2006/main" xmlns:r="http://schemas.openxmlformats.org/officeDocument/2006/relationships" xmlns:p="http://schemas.openxmlformats.org/presentationml/2006/main">
+  <p:cSld>
+    <p:spTree>
+      <p:nvGrpSpPr>
+        <p:cNvPr id="1" name=""/>
+        <p:cNvGrpSpPr/>
+        <p:nvPr/>
+      </p:nvGrpSpPr>
+      <p:grpSpPr>
+        <a:xfrm>
+          <a:off x="0" y="0"/>
+          <a:ext cx="0" cy="0"/>
+          <a:chOff x="0" y="0"/>
+          <a:chExt cx="0" cy="0"/>
+        </a:xfrm>
+      </p:grpSpPr>
+      <p:sp>
+        <p:nvSpPr>
+          <p:cNvPr id="2" name="Espace réservé de l'image des diapositives 1"/>
+          <p:cNvSpPr>
+            <a:spLocks noGrp="1" noRot="1" noChangeAspect="1"/>
+          </p:cNvSpPr>
+          <p:nvPr>
+            <p:ph type="sldImg"/>
+          </p:nvPr>
+        </p:nvSpPr>
+        <p:spPr/>
+      </p:sp>
+      <p:sp>
+        <p:nvSpPr>
+          <p:cNvPr id="3" name="Espace réservé des notes 2"/>
+          <p:cNvSpPr>
+            <a:spLocks noGrp="1"/>
+          </p:cNvSpPr>
+          <p:nvPr>
+            <p:ph type="body" idx="1"/>
+          </p:nvPr>
+        </p:nvSpPr>
+        <p:spPr/>
+        <p:txBody>
+          <a:bodyPr/>
+          <a:lstStyle/>
+          <a:p>
+            <a:r>
+              <a:rPr lang="fr-FR" dirty="0"/>
+              <a:t>La durée limitée du projet, ainsi qu’une analyse incomplète ont mené notre projet à certains défauts.</a:t>
+            </a:r>
+          </a:p>
+          <a:p>
+            <a:endParaRPr lang="fr-FR" dirty="0"/>
+          </a:p>
+          <a:p>
+            <a:r>
+              <a:rPr lang="fr-FR" dirty="0"/>
+              <a:t>Avec plus de temps, nous essaierons d’améliorer et compléter cachet. </a:t>
+            </a:r>
+          </a:p>
+          <a:p>
+            <a:endParaRPr lang="fr-FR" dirty="0"/>
+          </a:p>
+          <a:p>
+            <a:r>
+              <a:rPr lang="fr-FR" dirty="0"/>
+              <a:t>D’abord, cachet pourrait supporter la signature de répertoires de fichiers. Nous aurions pu créer une 4</a:t>
+            </a:r>
+            <a:r>
+              <a:rPr lang="fr-FR" baseline="30000" dirty="0"/>
+              <a:t>e</a:t>
+            </a:r>
+            <a:r>
+              <a:rPr lang="fr-FR" dirty="0"/>
+              <a:t> commande batch, utilisant Apache Commons </a:t>
+            </a:r>
+            <a:r>
+              <a:rPr lang="fr-FR" dirty="0" err="1"/>
+              <a:t>Compress</a:t>
+            </a:r>
+            <a:r>
+              <a:rPr lang="fr-FR" dirty="0"/>
+              <a:t> pour compresser le dossier puis signant comme elle le ferait pour un fichier avec </a:t>
+            </a:r>
+            <a:r>
+              <a:rPr lang="fr-FR" dirty="0" err="1"/>
+              <a:t>sign</a:t>
+            </a:r>
+            <a:r>
+              <a:rPr lang="fr-FR" dirty="0"/>
+              <a:t>. </a:t>
+            </a:r>
+          </a:p>
+          <a:p>
+            <a:endParaRPr lang="fr-FR" dirty="0"/>
+          </a:p>
+          <a:p>
+            <a:r>
+              <a:rPr lang="fr-FR" dirty="0"/>
+              <a:t>Keygen aurait pu permettre la dérivation d’une clé publique à partir d’une clé privée. Nous avions prévu cette fonctionnalité et essayé de l’implémenter, malheureusement nous avions déjà beaucoup avancé dans le projet et pas réalisé plus tôt que pour cela, il aurait fallu utiliser une bibliothèque externe comme </a:t>
+            </a:r>
+            <a:r>
+              <a:rPr lang="fr-FR" dirty="0" err="1"/>
+              <a:t>BouncyCastle</a:t>
+            </a:r>
+            <a:r>
+              <a:rPr lang="fr-FR" dirty="0"/>
+              <a:t>. Nous avons donc décidé de restreindre pour l’instant les fonctionnalités de keygen afin de limiter les dépendances externes comme déjà évoqué.</a:t>
+            </a:r>
+          </a:p>
+        </p:txBody>
+      </p:sp>
+      <p:sp>
+        <p:nvSpPr>
+          <p:cNvPr id="4" name="Espace réservé du numéro de diapositive 3"/>
+          <p:cNvSpPr>
+            <a:spLocks noGrp="1"/>
+          </p:cNvSpPr>
+          <p:nvPr>
+            <p:ph type="sldNum" sz="quarter" idx="5"/>
+          </p:nvPr>
+        </p:nvSpPr>
+        <p:spPr/>
+        <p:txBody>
+          <a:bodyPr/>
+          <a:lstStyle/>
+          <a:p>
+            <a:fld id="{87FD8E8A-CC1C-9841-9E49-7FCEDFE8C76C}" type="slidenum">
+              <a:rPr lang="fr-FR" smtClean="0"/>
+              <a:t>5</a:t>
+            </a:fld>
+            <a:endParaRPr lang="fr-FR"/>
+          </a:p>
+        </p:txBody>
+      </p:sp>
+    </p:spTree>
+    <p:extLst>
+      <p:ext uri="{BB962C8B-B14F-4D97-AF65-F5344CB8AC3E}">
+        <p14:creationId xmlns:p14="http://schemas.microsoft.com/office/powerpoint/2010/main" val="3950941294"/>
+      </p:ext>
+    </p:extLst>
+  </p:cSld>
+  <p:clrMapOvr>
+    <a:masterClrMapping/>
+  </p:clrMapOvr>
+</p:notes>
+</file>
+
 <file path=ppt/slideLayouts/slideLayout1.xml><?xml version="1.0" encoding="utf-8"?>
 <p:sldLayout xmlns:a="http://schemas.openxmlformats.org/drawingml/2006/main" xmlns:r="http://schemas.openxmlformats.org/officeDocument/2006/relationships" xmlns:p="http://schemas.openxmlformats.org/presentationml/2006/main" type="title" preserve="1">
   <p:cSld name="Diapositive de titre">
@@ -3766,7 +3918,7 @@
           <a:effectLst/>
           <a:extLst>
             <a:ext uri="{91240B29-F687-4f45-9708-019B960494DF}">
-              <a14:hiddenLine xmlns:a14="http://schemas.microsoft.com/office/drawing/2010/main" xmlns="" w="9525">
+              <a14:hiddenLine xmlns="" xmlns:a14="http://schemas.microsoft.com/office/drawing/2010/main" w="9525">
                 <a:solidFill>
                   <a:srgbClr val="000000"/>
                 </a:solidFill>
@@ -5283,7 +5435,7 @@
           <a:ln/>
           <a:extLst>
             <a:ext uri="{91240B29-F687-4f45-9708-019B960494DF}">
-              <a14:hiddenLine xmlns:a14="http://schemas.microsoft.com/office/drawing/2010/main" xmlns="" w="9525">
+              <a14:hiddenLine xmlns="" xmlns:a14="http://schemas.microsoft.com/office/drawing/2010/main" w="9525">
                 <a:solidFill>
                   <a:srgbClr val="000000"/>
                 </a:solidFill>
@@ -5555,7 +5707,7 @@
           <a:ln/>
           <a:extLst>
             <a:ext uri="{91240B29-F687-4f45-9708-019B960494DF}">
-              <a14:hiddenLine xmlns:a14="http://schemas.microsoft.com/office/drawing/2010/main" xmlns="" w="9525">
+              <a14:hiddenLine xmlns="" xmlns:a14="http://schemas.microsoft.com/office/drawing/2010/main" w="9525">
                 <a:solidFill>
                   <a:srgbClr val="000000"/>
                 </a:solidFill>
@@ -5835,7 +5987,7 @@
           <a:ln/>
           <a:extLst>
             <a:ext uri="{91240B29-F687-4f45-9708-019B960494DF}">
-              <a14:hiddenLine xmlns:a14="http://schemas.microsoft.com/office/drawing/2010/main" xmlns="" w="9525">
+              <a14:hiddenLine xmlns="" xmlns:a14="http://schemas.microsoft.com/office/drawing/2010/main" w="9525">
                 <a:solidFill>
                   <a:srgbClr val="000000"/>
                 </a:solidFill>
@@ -6455,7 +6607,7 @@
           <a:ln/>
           <a:extLst>
             <a:ext uri="{91240B29-F687-4f45-9708-019B960494DF}">
-              <a14:hiddenLine xmlns:a14="http://schemas.microsoft.com/office/drawing/2010/main" xmlns="" w="9525">
+              <a14:hiddenLine xmlns="" xmlns:a14="http://schemas.microsoft.com/office/drawing/2010/main" w="9525">
                 <a:solidFill>
                   <a:srgbClr val="000000"/>
                 </a:solidFill>
@@ -6791,7 +6943,7 @@
           <a:ln/>
           <a:extLst>
             <a:ext uri="{91240B29-F687-4f45-9708-019B960494DF}">
-              <a14:hiddenLine xmlns:a14="http://schemas.microsoft.com/office/drawing/2010/main" xmlns="" w="9525">
+              <a14:hiddenLine xmlns="" xmlns:a14="http://schemas.microsoft.com/office/drawing/2010/main" w="9525">
                 <a:solidFill>
                   <a:srgbClr val="000000"/>
                 </a:solidFill>
@@ -7265,7 +7417,7 @@
           <a:ln/>
           <a:extLst>
             <a:ext uri="{91240B29-F687-4f45-9708-019B960494DF}">
-              <a14:hiddenLine xmlns:a14="http://schemas.microsoft.com/office/drawing/2010/main" xmlns="" w="9525">
+              <a14:hiddenLine xmlns="" xmlns:a14="http://schemas.microsoft.com/office/drawing/2010/main" w="9525">
                 <a:solidFill>
                   <a:srgbClr val="000000"/>
                 </a:solidFill>
@@ -7688,7 +7840,7 @@
           <a:ln/>
           <a:extLst>
             <a:ext uri="{91240B29-F687-4f45-9708-019B960494DF}">
-              <a14:hiddenLine xmlns:a14="http://schemas.microsoft.com/office/drawing/2010/main" xmlns="" w="9525">
+              <a14:hiddenLine xmlns="" xmlns:a14="http://schemas.microsoft.com/office/drawing/2010/main" w="9525">
                 <a:solidFill>
                   <a:srgbClr val="000000"/>
                 </a:solidFill>
@@ -9092,6 +9244,12 @@
           <a:p>
             <a:r>
               <a:rPr lang="fr-FR" dirty="0"/>
+              <a:t>Suite / idées d’améliorations,</a:t>
+            </a:r>
+          </a:p>
+          <a:p>
+            <a:r>
+              <a:rPr lang="fr-FR" dirty="0"/>
               <a:t>Démo.</a:t>
             </a:r>
           </a:p>
@@ -9566,6 +9724,98 @@
     <p:extLst>
       <p:ext uri="{BB962C8B-B14F-4D97-AF65-F5344CB8AC3E}">
         <p14:creationId xmlns:p14="http://schemas.microsoft.com/office/powerpoint/2010/main" val="1106962197"/>
+      </p:ext>
+    </p:extLst>
+  </p:cSld>
+  <p:clrMapOvr>
+    <a:masterClrMapping/>
+  </p:clrMapOvr>
+</p:sld>
+</file>
+
+<file path=ppt/slides/slide5.xml><?xml version="1.0" encoding="utf-8"?>
+<p:sld xmlns:a="http://schemas.openxmlformats.org/drawingml/2006/main" xmlns:r="http://schemas.openxmlformats.org/officeDocument/2006/relationships" xmlns:p="http://schemas.openxmlformats.org/presentationml/2006/main">
+  <p:cSld>
+    <p:spTree>
+      <p:nvGrpSpPr>
+        <p:cNvPr id="1" name=""/>
+        <p:cNvGrpSpPr/>
+        <p:nvPr/>
+      </p:nvGrpSpPr>
+      <p:grpSpPr>
+        <a:xfrm>
+          <a:off x="0" y="0"/>
+          <a:ext cx="0" cy="0"/>
+          <a:chOff x="0" y="0"/>
+          <a:chExt cx="0" cy="0"/>
+        </a:xfrm>
+      </p:grpSpPr>
+      <p:sp>
+        <p:nvSpPr>
+          <p:cNvPr id="2" name="Titre 1">
+            <a:extLst>
+              <a:ext uri="{FF2B5EF4-FFF2-40B4-BE49-F238E27FC236}">
+                <a16:creationId xmlns:a16="http://schemas.microsoft.com/office/drawing/2014/main" id="{AC20DD1F-3F1A-660B-AA58-D46E5178794B}"/>
+              </a:ext>
+            </a:extLst>
+          </p:cNvPr>
+          <p:cNvSpPr>
+            <a:spLocks noGrp="1"/>
+          </p:cNvSpPr>
+          <p:nvPr>
+            <p:ph type="title"/>
+          </p:nvPr>
+        </p:nvSpPr>
+        <p:spPr/>
+        <p:txBody>
+          <a:bodyPr/>
+          <a:lstStyle/>
+          <a:p>
+            <a:r>
+              <a:rPr lang="fr-FR" dirty="0"/>
+              <a:t>Suite / idées d’améliorations</a:t>
+            </a:r>
+          </a:p>
+        </p:txBody>
+      </p:sp>
+      <p:sp>
+        <p:nvSpPr>
+          <p:cNvPr id="3" name="Espace réservé du contenu 2">
+            <a:extLst>
+              <a:ext uri="{FF2B5EF4-FFF2-40B4-BE49-F238E27FC236}">
+                <a16:creationId xmlns:a16="http://schemas.microsoft.com/office/drawing/2014/main" id="{A0648D61-F980-B47A-7FC0-CE638A48CA1E}"/>
+              </a:ext>
+            </a:extLst>
+          </p:cNvPr>
+          <p:cNvSpPr>
+            <a:spLocks noGrp="1"/>
+          </p:cNvSpPr>
+          <p:nvPr>
+            <p:ph idx="1"/>
+          </p:nvPr>
+        </p:nvSpPr>
+        <p:spPr/>
+        <p:txBody>
+          <a:bodyPr/>
+          <a:lstStyle/>
+          <a:p>
+            <a:r>
+              <a:rPr lang="fr-FR" dirty="0"/>
+              <a:t>Signer des répertoires de fichiers,</a:t>
+            </a:r>
+          </a:p>
+          <a:p>
+            <a:r>
+              <a:rPr lang="fr-FR" dirty="0"/>
+              <a:t>Capacité de keygen à dériver une clé publique.</a:t>
+            </a:r>
+          </a:p>
+        </p:txBody>
+      </p:sp>
+    </p:spTree>
+    <p:extLst>
+      <p:ext uri="{BB962C8B-B14F-4D97-AF65-F5344CB8AC3E}">
+        <p14:creationId xmlns:p14="http://schemas.microsoft.com/office/powerpoint/2010/main" val="2300111009"/>
       </p:ext>
     </p:extLst>
   </p:cSld>

</xml_diff>

<commit_message>
Added a slide describing the project structure to presentation
</commit_message>
<xml_diff>
--- a/cachet.pptx
+++ b/cachet.pptx
@@ -5,14 +5,15 @@
     <p:sldMasterId id="2147483648" r:id="rId1"/>
   </p:sldMasterIdLst>
   <p:notesMasterIdLst>
-    <p:notesMasterId r:id="rId7"/>
+    <p:notesMasterId r:id="rId8"/>
   </p:notesMasterIdLst>
   <p:sldIdLst>
     <p:sldId id="256" r:id="rId2"/>
     <p:sldId id="257" r:id="rId3"/>
     <p:sldId id="258" r:id="rId4"/>
-    <p:sldId id="259" r:id="rId5"/>
-    <p:sldId id="260" r:id="rId6"/>
+    <p:sldId id="261" r:id="rId5"/>
+    <p:sldId id="259" r:id="rId6"/>
+    <p:sldId id="260" r:id="rId7"/>
   </p:sldIdLst>
   <p:sldSz cx="12192000" cy="6858000"/>
   <p:notesSz cx="6858000" cy="9144000"/>
@@ -3637,7 +3638,18 @@
           <a:bodyPr/>
           <a:lstStyle/>
           <a:p>
-            <a:endParaRPr lang="fr-FR" dirty="0"/>
+            <a:r>
+              <a:rPr lang="fr-FR" dirty="0"/>
+              <a:t>La structure du projet est assez simple, un package de fonctions utilitaires qui regroupent toute la logique de lecture/écriture dans des fichiers, et de génération de clés et signatures. Un </a:t>
+            </a:r>
+            <a:r>
+              <a:rPr lang="fr-FR"/>
+              <a:t>second package </a:t>
+            </a:r>
+            <a:r>
+              <a:rPr lang="fr-FR" dirty="0"/>
+              <a:t>pour les exceptions, et un dernier pour les commandes. </a:t>
+            </a:r>
           </a:p>
         </p:txBody>
       </p:sp>
@@ -3667,7 +3679,7 @@
     </p:spTree>
     <p:extLst>
       <p:ext uri="{BB962C8B-B14F-4D97-AF65-F5344CB8AC3E}">
-        <p14:creationId xmlns:p14="http://schemas.microsoft.com/office/powerpoint/2010/main" val="1967424831"/>
+        <p14:creationId xmlns:p14="http://schemas.microsoft.com/office/powerpoint/2010/main" val="2964743962"/>
       </p:ext>
     </p:extLst>
   </p:cSld>
@@ -3721,69 +3733,7 @@
           <a:bodyPr/>
           <a:lstStyle/>
           <a:p>
-            <a:r>
-              <a:rPr lang="fr-FR" dirty="0"/>
-              <a:t>La durée limitée du projet, ainsi qu’une analyse incomplète ont mené notre projet à certains défauts.</a:t>
-            </a:r>
-          </a:p>
-          <a:p>
             <a:endParaRPr lang="fr-FR" dirty="0"/>
-          </a:p>
-          <a:p>
-            <a:r>
-              <a:rPr lang="fr-FR" dirty="0"/>
-              <a:t>Avec plus de temps, nous essaierons d’améliorer et compléter cachet. </a:t>
-            </a:r>
-          </a:p>
-          <a:p>
-            <a:endParaRPr lang="fr-FR" dirty="0"/>
-          </a:p>
-          <a:p>
-            <a:r>
-              <a:rPr lang="fr-FR" dirty="0"/>
-              <a:t>D’abord, cachet pourrait supporter la signature de répertoires de fichiers. Nous aurions pu créer une 4</a:t>
-            </a:r>
-            <a:r>
-              <a:rPr lang="fr-FR" baseline="30000" dirty="0"/>
-              <a:t>e</a:t>
-            </a:r>
-            <a:r>
-              <a:rPr lang="fr-FR" dirty="0"/>
-              <a:t> commande batch, utilisant Apache Commons </a:t>
-            </a:r>
-            <a:r>
-              <a:rPr lang="fr-FR" dirty="0" err="1"/>
-              <a:t>Compress</a:t>
-            </a:r>
-            <a:r>
-              <a:rPr lang="fr-FR" dirty="0"/>
-              <a:t> pour compresser le dossier puis signant comme elle le ferait pour un fichier avec </a:t>
-            </a:r>
-            <a:r>
-              <a:rPr lang="fr-FR" dirty="0" err="1"/>
-              <a:t>sign</a:t>
-            </a:r>
-            <a:r>
-              <a:rPr lang="fr-FR" dirty="0"/>
-              <a:t>. </a:t>
-            </a:r>
-          </a:p>
-          <a:p>
-            <a:endParaRPr lang="fr-FR" dirty="0"/>
-          </a:p>
-          <a:p>
-            <a:r>
-              <a:rPr lang="fr-FR" dirty="0"/>
-              <a:t>Keygen aurait pu permettre la dérivation d’une clé publique à partir d’une clé privée. Nous avions prévu cette fonctionnalité et essayé de l’implémenter, malheureusement nous avions déjà beaucoup avancé dans le projet et pas réalisé plus tôt que pour cela, il aurait fallu utiliser une bibliothèque externe comme </a:t>
-            </a:r>
-            <a:r>
-              <a:rPr lang="fr-FR" dirty="0" err="1"/>
-              <a:t>BouncyCastle</a:t>
-            </a:r>
-            <a:r>
-              <a:rPr lang="fr-FR" dirty="0"/>
-              <a:t>. Nous avons donc décidé de restreindre pour l’instant les fonctionnalités de keygen afin de limiter les dépendances externes comme déjà évoqué.</a:t>
-            </a:r>
           </a:p>
         </p:txBody>
       </p:sp>
@@ -3805,6 +3755,152 @@
             <a:fld id="{87FD8E8A-CC1C-9841-9E49-7FCEDFE8C76C}" type="slidenum">
               <a:rPr lang="fr-FR" smtClean="0"/>
               <a:t>5</a:t>
+            </a:fld>
+            <a:endParaRPr lang="fr-FR"/>
+          </a:p>
+        </p:txBody>
+      </p:sp>
+    </p:spTree>
+    <p:extLst>
+      <p:ext uri="{BB962C8B-B14F-4D97-AF65-F5344CB8AC3E}">
+        <p14:creationId xmlns:p14="http://schemas.microsoft.com/office/powerpoint/2010/main" val="1967424831"/>
+      </p:ext>
+    </p:extLst>
+  </p:cSld>
+  <p:clrMapOvr>
+    <a:masterClrMapping/>
+  </p:clrMapOvr>
+</p:notes>
+</file>
+
+<file path=ppt/notesSlides/notesSlide6.xml><?xml version="1.0" encoding="utf-8"?>
+<p:notes xmlns:a="http://schemas.openxmlformats.org/drawingml/2006/main" xmlns:r="http://schemas.openxmlformats.org/officeDocument/2006/relationships" xmlns:p="http://schemas.openxmlformats.org/presentationml/2006/main">
+  <p:cSld>
+    <p:spTree>
+      <p:nvGrpSpPr>
+        <p:cNvPr id="1" name=""/>
+        <p:cNvGrpSpPr/>
+        <p:nvPr/>
+      </p:nvGrpSpPr>
+      <p:grpSpPr>
+        <a:xfrm>
+          <a:off x="0" y="0"/>
+          <a:ext cx="0" cy="0"/>
+          <a:chOff x="0" y="0"/>
+          <a:chExt cx="0" cy="0"/>
+        </a:xfrm>
+      </p:grpSpPr>
+      <p:sp>
+        <p:nvSpPr>
+          <p:cNvPr id="2" name="Espace réservé de l'image des diapositives 1"/>
+          <p:cNvSpPr>
+            <a:spLocks noGrp="1" noRot="1" noChangeAspect="1"/>
+          </p:cNvSpPr>
+          <p:nvPr>
+            <p:ph type="sldImg"/>
+          </p:nvPr>
+        </p:nvSpPr>
+        <p:spPr/>
+      </p:sp>
+      <p:sp>
+        <p:nvSpPr>
+          <p:cNvPr id="3" name="Espace réservé des notes 2"/>
+          <p:cNvSpPr>
+            <a:spLocks noGrp="1"/>
+          </p:cNvSpPr>
+          <p:nvPr>
+            <p:ph type="body" idx="1"/>
+          </p:nvPr>
+        </p:nvSpPr>
+        <p:spPr/>
+        <p:txBody>
+          <a:bodyPr/>
+          <a:lstStyle/>
+          <a:p>
+            <a:r>
+              <a:rPr lang="fr-FR" dirty="0"/>
+              <a:t>La durée limitée du projet, ainsi qu’une analyse incomplète ont mené notre projet à certains défauts.</a:t>
+            </a:r>
+          </a:p>
+          <a:p>
+            <a:endParaRPr lang="fr-FR" dirty="0"/>
+          </a:p>
+          <a:p>
+            <a:r>
+              <a:rPr lang="fr-FR" dirty="0"/>
+              <a:t>Avec plus de temps, nous essaierons d’améliorer et compléter cachet. </a:t>
+            </a:r>
+          </a:p>
+          <a:p>
+            <a:endParaRPr lang="fr-FR" dirty="0"/>
+          </a:p>
+          <a:p>
+            <a:r>
+              <a:rPr lang="fr-FR" dirty="0"/>
+              <a:t>D’abord, cachet pourrait supporter la signature de répertoires de fichiers. Nous aurions pu créer une 4</a:t>
+            </a:r>
+            <a:r>
+              <a:rPr lang="fr-FR" baseline="30000" dirty="0"/>
+              <a:t>e</a:t>
+            </a:r>
+            <a:r>
+              <a:rPr lang="fr-FR" dirty="0"/>
+              <a:t> commande batch, utilisant Apache Commons </a:t>
+            </a:r>
+            <a:r>
+              <a:rPr lang="fr-FR" dirty="0" err="1"/>
+              <a:t>Compress</a:t>
+            </a:r>
+            <a:r>
+              <a:rPr lang="fr-FR" dirty="0"/>
+              <a:t> pour compresser le dossier puis signant comme elle le ferait pour un fichier avec </a:t>
+            </a:r>
+            <a:r>
+              <a:rPr lang="fr-FR" dirty="0" err="1"/>
+              <a:t>sign</a:t>
+            </a:r>
+            <a:r>
+              <a:rPr lang="fr-FR" dirty="0"/>
+              <a:t>. </a:t>
+            </a:r>
+          </a:p>
+          <a:p>
+            <a:endParaRPr lang="fr-FR" dirty="0"/>
+          </a:p>
+          <a:p>
+            <a:r>
+              <a:rPr lang="fr-FR" dirty="0"/>
+              <a:t>Keygen aurait pu permettre la dérivation d’une clé publique à partir d’une clé privée. Nous avions prévu cette fonctionnalité et essayé de l’implémenter, malheureusement nous avions déjà beaucoup avancé dans le projet et pas réalisé plus tôt que pour cela, il aurait fallu utiliser une bibliothèque externe comme </a:t>
+            </a:r>
+            <a:r>
+              <a:rPr lang="fr-FR" dirty="0" err="1"/>
+              <a:t>BouncyCastle</a:t>
+            </a:r>
+            <a:r>
+              <a:rPr lang="fr-FR" dirty="0"/>
+              <a:t>. Nous avons donc décidé de restreindre pour l’instant les fonctionnalités de keygen afin de limiter les dépendances externes comme déjà évoqué.</a:t>
+            </a:r>
+          </a:p>
+        </p:txBody>
+      </p:sp>
+      <p:sp>
+        <p:nvSpPr>
+          <p:cNvPr id="4" name="Espace réservé du numéro de diapositive 3"/>
+          <p:cNvSpPr>
+            <a:spLocks noGrp="1"/>
+          </p:cNvSpPr>
+          <p:nvPr>
+            <p:ph type="sldNum" sz="quarter" idx="5"/>
+          </p:nvPr>
+        </p:nvSpPr>
+        <p:spPr/>
+        <p:txBody>
+          <a:bodyPr/>
+          <a:lstStyle/>
+          <a:p>
+            <a:fld id="{87FD8E8A-CC1C-9841-9E49-7FCEDFE8C76C}" type="slidenum">
+              <a:rPr lang="fr-FR" smtClean="0"/>
+              <a:t>6</a:t>
             </a:fld>
             <a:endParaRPr lang="fr-FR"/>
           </a:p>
@@ -3918,7 +4014,7 @@
           <a:effectLst/>
           <a:extLst>
             <a:ext uri="{91240B29-F687-4f45-9708-019B960494DF}">
-              <a14:hiddenLine xmlns="" xmlns:a14="http://schemas.microsoft.com/office/drawing/2010/main" w="9525">
+              <a14:hiddenLine xmlns:a14="http://schemas.microsoft.com/office/drawing/2010/main" xmlns="" w="9525">
                 <a:solidFill>
                   <a:srgbClr val="000000"/>
                 </a:solidFill>
@@ -5435,7 +5531,7 @@
           <a:ln/>
           <a:extLst>
             <a:ext uri="{91240B29-F687-4f45-9708-019B960494DF}">
-              <a14:hiddenLine xmlns="" xmlns:a14="http://schemas.microsoft.com/office/drawing/2010/main" w="9525">
+              <a14:hiddenLine xmlns:a14="http://schemas.microsoft.com/office/drawing/2010/main" xmlns="" w="9525">
                 <a:solidFill>
                   <a:srgbClr val="000000"/>
                 </a:solidFill>
@@ -5707,7 +5803,7 @@
           <a:ln/>
           <a:extLst>
             <a:ext uri="{91240B29-F687-4f45-9708-019B960494DF}">
-              <a14:hiddenLine xmlns="" xmlns:a14="http://schemas.microsoft.com/office/drawing/2010/main" w="9525">
+              <a14:hiddenLine xmlns:a14="http://schemas.microsoft.com/office/drawing/2010/main" xmlns="" w="9525">
                 <a:solidFill>
                   <a:srgbClr val="000000"/>
                 </a:solidFill>
@@ -5987,7 +6083,7 @@
           <a:ln/>
           <a:extLst>
             <a:ext uri="{91240B29-F687-4f45-9708-019B960494DF}">
-              <a14:hiddenLine xmlns="" xmlns:a14="http://schemas.microsoft.com/office/drawing/2010/main" w="9525">
+              <a14:hiddenLine xmlns:a14="http://schemas.microsoft.com/office/drawing/2010/main" xmlns="" w="9525">
                 <a:solidFill>
                   <a:srgbClr val="000000"/>
                 </a:solidFill>
@@ -6607,7 +6703,7 @@
           <a:ln/>
           <a:extLst>
             <a:ext uri="{91240B29-F687-4f45-9708-019B960494DF}">
-              <a14:hiddenLine xmlns="" xmlns:a14="http://schemas.microsoft.com/office/drawing/2010/main" w="9525">
+              <a14:hiddenLine xmlns:a14="http://schemas.microsoft.com/office/drawing/2010/main" xmlns="" w="9525">
                 <a:solidFill>
                   <a:srgbClr val="000000"/>
                 </a:solidFill>
@@ -6943,7 +7039,7 @@
           <a:ln/>
           <a:extLst>
             <a:ext uri="{91240B29-F687-4f45-9708-019B960494DF}">
-              <a14:hiddenLine xmlns="" xmlns:a14="http://schemas.microsoft.com/office/drawing/2010/main" w="9525">
+              <a14:hiddenLine xmlns:a14="http://schemas.microsoft.com/office/drawing/2010/main" xmlns="" w="9525">
                 <a:solidFill>
                   <a:srgbClr val="000000"/>
                 </a:solidFill>
@@ -7417,7 +7513,7 @@
           <a:ln/>
           <a:extLst>
             <a:ext uri="{91240B29-F687-4f45-9708-019B960494DF}">
-              <a14:hiddenLine xmlns="" xmlns:a14="http://schemas.microsoft.com/office/drawing/2010/main" w="9525">
+              <a14:hiddenLine xmlns:a14="http://schemas.microsoft.com/office/drawing/2010/main" xmlns="" w="9525">
                 <a:solidFill>
                   <a:srgbClr val="000000"/>
                 </a:solidFill>
@@ -7840,7 +7936,7 @@
           <a:ln/>
           <a:extLst>
             <a:ext uri="{91240B29-F687-4f45-9708-019B960494DF}">
-              <a14:hiddenLine xmlns="" xmlns:a14="http://schemas.microsoft.com/office/drawing/2010/main" w="9525">
+              <a14:hiddenLine xmlns:a14="http://schemas.microsoft.com/office/drawing/2010/main" xmlns="" w="9525">
                 <a:solidFill>
                   <a:srgbClr val="000000"/>
                 </a:solidFill>
@@ -9238,6 +9334,12 @@
           <a:p>
             <a:r>
               <a:rPr lang="fr-FR" dirty="0"/>
+              <a:t>Structure du projet,</a:t>
+            </a:r>
+          </a:p>
+          <a:p>
+            <a:r>
+              <a:rPr lang="fr-FR" dirty="0"/>
               <a:t>Détails d’implémentation,</a:t>
             </a:r>
           </a:p>
@@ -9250,7 +9352,7 @@
           <a:p>
             <a:r>
               <a:rPr lang="fr-FR" dirty="0"/>
-              <a:t>Démo.</a:t>
+              <a:t>Démo et questions.</a:t>
             </a:r>
           </a:p>
         </p:txBody>
@@ -9358,6 +9460,517 @@
 </file>
 
 <file path=ppt/slides/slide4.xml><?xml version="1.0" encoding="utf-8"?>
+<p:sld xmlns:a="http://schemas.openxmlformats.org/drawingml/2006/main" xmlns:r="http://schemas.openxmlformats.org/officeDocument/2006/relationships" xmlns:p="http://schemas.openxmlformats.org/presentationml/2006/main">
+  <p:cSld>
+    <p:bg>
+      <p:bgPr>
+        <a:solidFill>
+          <a:schemeClr val="bg1"/>
+        </a:solidFill>
+        <a:effectLst/>
+      </p:bgPr>
+    </p:bg>
+    <p:spTree>
+      <p:nvGrpSpPr>
+        <p:cNvPr id="1" name=""/>
+        <p:cNvGrpSpPr/>
+        <p:nvPr/>
+      </p:nvGrpSpPr>
+      <p:grpSpPr>
+        <a:xfrm>
+          <a:off x="0" y="0"/>
+          <a:ext cx="0" cy="0"/>
+          <a:chOff x="0" y="0"/>
+          <a:chExt cx="0" cy="0"/>
+        </a:xfrm>
+      </p:grpSpPr>
+      <p:sp>
+        <p:nvSpPr>
+          <p:cNvPr id="9" name="Freeform 6">
+            <a:extLst>
+              <a:ext uri="{FF2B5EF4-FFF2-40B4-BE49-F238E27FC236}">
+                <a16:creationId xmlns:a16="http://schemas.microsoft.com/office/drawing/2014/main" id="{133F8CB7-795C-4272-9073-64D8CF97F220}"/>
+              </a:ext>
+              <a:ext uri="{C183D7F6-B498-43B3-948B-1728B52AA6E4}">
+                <adec:decorative xmlns:adec="http://schemas.microsoft.com/office/drawing/2017/decorative" val="1"/>
+              </a:ext>
+            </a:extLst>
+          </p:cNvPr>
+          <p:cNvSpPr>
+            <a:spLocks noGrp="1" noRot="1" noChangeAspect="1" noMove="1" noResize="1" noEditPoints="1" noAdjustHandles="1" noChangeArrowheads="1" noChangeShapeType="1" noTextEdit="1"/>
+          </p:cNvSpPr>
+          <p:nvPr>
+            <p:extLst>
+              <p:ext uri="{386F3935-93C4-4BCD-93E2-E3B085C9AB24}">
+                <p16:designElem xmlns:p16="http://schemas.microsoft.com/office/powerpoint/2015/main" val="1"/>
+              </p:ext>
+            </p:extLst>
+          </p:nvPr>
+        </p:nvSpPr>
+        <p:spPr bwMode="auto">
+          <a:xfrm>
+            <a:off x="0" y="-3175"/>
+            <a:ext cx="12192000" cy="5203825"/>
+          </a:xfrm>
+          <a:custGeom>
+            <a:avLst/>
+            <a:gdLst/>
+            <a:ahLst/>
+            <a:cxnLst/>
+            <a:rect l="0" t="0" r="r" b="b"/>
+            <a:pathLst>
+              <a:path w="5760" h="3278">
+                <a:moveTo>
+                  <a:pt x="5760" y="0"/>
+                </a:moveTo>
+                <a:lnTo>
+                  <a:pt x="0" y="0"/>
+                </a:lnTo>
+                <a:lnTo>
+                  <a:pt x="0" y="3090"/>
+                </a:lnTo>
+                <a:lnTo>
+                  <a:pt x="943" y="3090"/>
+                </a:lnTo>
+                <a:lnTo>
+                  <a:pt x="1123" y="3270"/>
+                </a:lnTo>
+                <a:lnTo>
+                  <a:pt x="1123" y="3270"/>
+                </a:lnTo>
+                <a:lnTo>
+                  <a:pt x="1127" y="3272"/>
+                </a:lnTo>
+                <a:lnTo>
+                  <a:pt x="1133" y="3275"/>
+                </a:lnTo>
+                <a:lnTo>
+                  <a:pt x="1139" y="3278"/>
+                </a:lnTo>
+                <a:lnTo>
+                  <a:pt x="1144" y="3278"/>
+                </a:lnTo>
+                <a:lnTo>
+                  <a:pt x="1150" y="3278"/>
+                </a:lnTo>
+                <a:lnTo>
+                  <a:pt x="1155" y="3275"/>
+                </a:lnTo>
+                <a:lnTo>
+                  <a:pt x="1161" y="3272"/>
+                </a:lnTo>
+                <a:lnTo>
+                  <a:pt x="1165" y="3270"/>
+                </a:lnTo>
+                <a:lnTo>
+                  <a:pt x="1345" y="3090"/>
+                </a:lnTo>
+                <a:lnTo>
+                  <a:pt x="5760" y="3090"/>
+                </a:lnTo>
+                <a:lnTo>
+                  <a:pt x="5760" y="0"/>
+                </a:lnTo>
+                <a:close/>
+              </a:path>
+            </a:pathLst>
+          </a:custGeom>
+          <a:ln/>
+          <a:effectLst/>
+          <a:extLst>
+            <a:ext uri="{91240B29-F687-4f45-9708-019B960494DF}">
+              <a14:hiddenLine xmlns="" xmlns:a16="http://schemas.microsoft.com/office/drawing/2014/main" xmlns:p14="http://schemas.microsoft.com/office/powerpoint/2010/main" xmlns:a14="http://schemas.microsoft.com/office/drawing/2010/main" w="9525">
+                <a:solidFill>
+                  <a:srgbClr val="000000"/>
+                </a:solidFill>
+                <a:round/>
+                <a:headEnd/>
+                <a:tailEnd/>
+              </a14:hiddenLine>
+            </a:ext>
+          </a:extLst>
+        </p:spPr>
+        <p:style>
+          <a:lnRef idx="1">
+            <a:schemeClr val="accent1"/>
+          </a:lnRef>
+          <a:fillRef idx="3">
+            <a:schemeClr val="accent1"/>
+          </a:fillRef>
+          <a:effectRef idx="2">
+            <a:schemeClr val="accent1"/>
+          </a:effectRef>
+          <a:fontRef idx="minor">
+            <a:schemeClr val="lt1"/>
+          </a:fontRef>
+        </p:style>
+        <p:txBody>
+          <a:bodyPr/>
+          <a:lstStyle/>
+          <a:p>
+            <a:endParaRPr lang="fr-FR"/>
+          </a:p>
+        </p:txBody>
+      </p:sp>
+      <p:sp>
+        <p:nvSpPr>
+          <p:cNvPr id="11" name="Rectangle 10">
+            <a:extLst>
+              <a:ext uri="{FF2B5EF4-FFF2-40B4-BE49-F238E27FC236}">
+                <a16:creationId xmlns:a16="http://schemas.microsoft.com/office/drawing/2014/main" id="{B7743172-17A8-4FA4-8434-B813E03B7665}"/>
+              </a:ext>
+              <a:ext uri="{C183D7F6-B498-43B3-948B-1728B52AA6E4}">
+                <adec:decorative xmlns:adec="http://schemas.microsoft.com/office/drawing/2017/decorative" val="1"/>
+              </a:ext>
+            </a:extLst>
+          </p:cNvPr>
+          <p:cNvSpPr>
+            <a:spLocks noGrp="1" noRot="1" noChangeAspect="1" noMove="1" noResize="1" noEditPoints="1" noAdjustHandles="1" noChangeArrowheads="1" noChangeShapeType="1" noTextEdit="1"/>
+          </p:cNvSpPr>
+          <p:nvPr>
+            <p:extLst>
+              <p:ext uri="{386F3935-93C4-4BCD-93E2-E3B085C9AB24}">
+                <p16:designElem xmlns:p16="http://schemas.microsoft.com/office/powerpoint/2015/main" val="1"/>
+              </p:ext>
+            </p:extLst>
+          </p:nvPr>
+        </p:nvSpPr>
+        <p:spPr>
+          <a:xfrm>
+            <a:off x="0" y="0"/>
+            <a:ext cx="12192000" cy="6858000"/>
+          </a:xfrm>
+          <a:prstGeom prst="rect">
+            <a:avLst/>
+          </a:prstGeom>
+          <a:solidFill>
+            <a:schemeClr val="bg1"/>
+          </a:solidFill>
+          <a:ln>
+            <a:noFill/>
+          </a:ln>
+        </p:spPr>
+        <p:style>
+          <a:lnRef idx="2">
+            <a:schemeClr val="accent1">
+              <a:shade val="50000"/>
+            </a:schemeClr>
+          </a:lnRef>
+          <a:fillRef idx="1">
+            <a:schemeClr val="accent1"/>
+          </a:fillRef>
+          <a:effectRef idx="0">
+            <a:schemeClr val="accent1"/>
+          </a:effectRef>
+          <a:fontRef idx="minor">
+            <a:schemeClr val="lt1"/>
+          </a:fontRef>
+        </p:style>
+        <p:txBody>
+          <a:bodyPr rtlCol="0" anchor="ctr"/>
+          <a:lstStyle/>
+          <a:p>
+            <a:pPr algn="ctr"/>
+            <a:endParaRPr lang="en-US"/>
+          </a:p>
+        </p:txBody>
+      </p:sp>
+      <p:sp>
+        <p:nvSpPr>
+          <p:cNvPr id="13" name="Freeform 23">
+            <a:extLst>
+              <a:ext uri="{FF2B5EF4-FFF2-40B4-BE49-F238E27FC236}">
+                <a16:creationId xmlns:a16="http://schemas.microsoft.com/office/drawing/2014/main" id="{4CE1233C-FD2F-489E-BFDE-086F5FED6491}"/>
+              </a:ext>
+              <a:ext uri="{C183D7F6-B498-43B3-948B-1728B52AA6E4}">
+                <adec:decorative xmlns:adec="http://schemas.microsoft.com/office/drawing/2017/decorative" val="1"/>
+              </a:ext>
+            </a:extLst>
+          </p:cNvPr>
+          <p:cNvSpPr>
+            <a:spLocks noGrp="1" noRot="1" noChangeAspect="1" noMove="1" noResize="1" noEditPoints="1" noAdjustHandles="1" noChangeArrowheads="1" noChangeShapeType="1" noTextEdit="1"/>
+          </p:cNvSpPr>
+          <p:nvPr>
+            <p:extLst>
+              <p:ext uri="{386F3935-93C4-4BCD-93E2-E3B085C9AB24}">
+                <p16:designElem xmlns:p16="http://schemas.microsoft.com/office/powerpoint/2015/main" val="1"/>
+              </p:ext>
+            </p:extLst>
+          </p:nvPr>
+        </p:nvSpPr>
+        <p:spPr bwMode="white">
+          <a:xfrm>
+            <a:off x="0" y="0"/>
+            <a:ext cx="4637005" cy="6858000"/>
+          </a:xfrm>
+          <a:custGeom>
+            <a:avLst/>
+            <a:gdLst>
+              <a:gd name="connsiteX0" fmla="*/ 0 w 4637005"/>
+              <a:gd name="connsiteY0" fmla="*/ 0 h 6858000"/>
+              <a:gd name="connsiteX1" fmla="*/ 4637005 w 4637005"/>
+              <a:gd name="connsiteY1" fmla="*/ 0 h 6858000"/>
+              <a:gd name="connsiteX2" fmla="*/ 4637005 w 4637005"/>
+              <a:gd name="connsiteY2" fmla="*/ 1900238 h 6858000"/>
+              <a:gd name="connsiteX3" fmla="*/ 4266589 w 4637005"/>
+              <a:gd name="connsiteY3" fmla="*/ 2178050 h 6858000"/>
+              <a:gd name="connsiteX4" fmla="*/ 4262355 w 4637005"/>
+              <a:gd name="connsiteY4" fmla="*/ 2184400 h 6858000"/>
+              <a:gd name="connsiteX5" fmla="*/ 4256005 w 4637005"/>
+              <a:gd name="connsiteY5" fmla="*/ 2193925 h 6858000"/>
+              <a:gd name="connsiteX6" fmla="*/ 4249655 w 4637005"/>
+              <a:gd name="connsiteY6" fmla="*/ 2201863 h 6858000"/>
+              <a:gd name="connsiteX7" fmla="*/ 4249655 w 4637005"/>
+              <a:gd name="connsiteY7" fmla="*/ 2211388 h 6858000"/>
+              <a:gd name="connsiteX8" fmla="*/ 4249655 w 4637005"/>
+              <a:gd name="connsiteY8" fmla="*/ 2220913 h 6858000"/>
+              <a:gd name="connsiteX9" fmla="*/ 4256005 w 4637005"/>
+              <a:gd name="connsiteY9" fmla="*/ 2228850 h 6858000"/>
+              <a:gd name="connsiteX10" fmla="*/ 4262355 w 4637005"/>
+              <a:gd name="connsiteY10" fmla="*/ 2238375 h 6858000"/>
+              <a:gd name="connsiteX11" fmla="*/ 4266589 w 4637005"/>
+              <a:gd name="connsiteY11" fmla="*/ 2244725 h 6858000"/>
+              <a:gd name="connsiteX12" fmla="*/ 4637005 w 4637005"/>
+              <a:gd name="connsiteY12" fmla="*/ 2522538 h 6858000"/>
+              <a:gd name="connsiteX13" fmla="*/ 4637005 w 4637005"/>
+              <a:gd name="connsiteY13" fmla="*/ 6858000 h 6858000"/>
+              <a:gd name="connsiteX14" fmla="*/ 0 w 4637005"/>
+              <a:gd name="connsiteY14" fmla="*/ 6858000 h 6858000"/>
+            </a:gdLst>
+            <a:ahLst/>
+            <a:cxnLst>
+              <a:cxn ang="0">
+                <a:pos x="connsiteX0" y="connsiteY0"/>
+              </a:cxn>
+              <a:cxn ang="0">
+                <a:pos x="connsiteX1" y="connsiteY1"/>
+              </a:cxn>
+              <a:cxn ang="0">
+                <a:pos x="connsiteX2" y="connsiteY2"/>
+              </a:cxn>
+              <a:cxn ang="0">
+                <a:pos x="connsiteX3" y="connsiteY3"/>
+              </a:cxn>
+              <a:cxn ang="0">
+                <a:pos x="connsiteX4" y="connsiteY4"/>
+              </a:cxn>
+              <a:cxn ang="0">
+                <a:pos x="connsiteX5" y="connsiteY5"/>
+              </a:cxn>
+              <a:cxn ang="0">
+                <a:pos x="connsiteX6" y="connsiteY6"/>
+              </a:cxn>
+              <a:cxn ang="0">
+                <a:pos x="connsiteX7" y="connsiteY7"/>
+              </a:cxn>
+              <a:cxn ang="0">
+                <a:pos x="connsiteX8" y="connsiteY8"/>
+              </a:cxn>
+              <a:cxn ang="0">
+                <a:pos x="connsiteX9" y="connsiteY9"/>
+              </a:cxn>
+              <a:cxn ang="0">
+                <a:pos x="connsiteX10" y="connsiteY10"/>
+              </a:cxn>
+              <a:cxn ang="0">
+                <a:pos x="connsiteX11" y="connsiteY11"/>
+              </a:cxn>
+              <a:cxn ang="0">
+                <a:pos x="connsiteX12" y="connsiteY12"/>
+              </a:cxn>
+              <a:cxn ang="0">
+                <a:pos x="connsiteX13" y="connsiteY13"/>
+              </a:cxn>
+              <a:cxn ang="0">
+                <a:pos x="connsiteX14" y="connsiteY14"/>
+              </a:cxn>
+            </a:cxnLst>
+            <a:rect l="l" t="t" r="r" b="b"/>
+            <a:pathLst>
+              <a:path w="4637005" h="6858000">
+                <a:moveTo>
+                  <a:pt x="0" y="0"/>
+                </a:moveTo>
+                <a:lnTo>
+                  <a:pt x="4637005" y="0"/>
+                </a:lnTo>
+                <a:lnTo>
+                  <a:pt x="4637005" y="1900238"/>
+                </a:lnTo>
+                <a:lnTo>
+                  <a:pt x="4266589" y="2178050"/>
+                </a:lnTo>
+                <a:lnTo>
+                  <a:pt x="4262355" y="2184400"/>
+                </a:lnTo>
+                <a:lnTo>
+                  <a:pt x="4256005" y="2193925"/>
+                </a:lnTo>
+                <a:lnTo>
+                  <a:pt x="4249655" y="2201863"/>
+                </a:lnTo>
+                <a:lnTo>
+                  <a:pt x="4249655" y="2211388"/>
+                </a:lnTo>
+                <a:lnTo>
+                  <a:pt x="4249655" y="2220913"/>
+                </a:lnTo>
+                <a:lnTo>
+                  <a:pt x="4256005" y="2228850"/>
+                </a:lnTo>
+                <a:lnTo>
+                  <a:pt x="4262355" y="2238375"/>
+                </a:lnTo>
+                <a:lnTo>
+                  <a:pt x="4266589" y="2244725"/>
+                </a:lnTo>
+                <a:lnTo>
+                  <a:pt x="4637005" y="2522538"/>
+                </a:lnTo>
+                <a:lnTo>
+                  <a:pt x="4637005" y="6858000"/>
+                </a:lnTo>
+                <a:lnTo>
+                  <a:pt x="0" y="6858000"/>
+                </a:lnTo>
+                <a:close/>
+              </a:path>
+            </a:pathLst>
+          </a:custGeom>
+          <a:blipFill>
+            <a:blip r:embed="rId3">
+              <a:duotone>
+                <a:schemeClr val="accent1">
+                  <a:tint val="98000"/>
+                  <a:lumMod val="102000"/>
+                </a:schemeClr>
+                <a:schemeClr val="accent1">
+                  <a:shade val="98000"/>
+                  <a:lumMod val="98000"/>
+                </a:schemeClr>
+              </a:duotone>
+            </a:blip>
+            <a:tile tx="0" ty="0" sx="100000" sy="100000" flip="none" algn="tl"/>
+          </a:blipFill>
+          <a:ln>
+            <a:headEnd/>
+            <a:tailEnd/>
+          </a:ln>
+        </p:spPr>
+        <p:style>
+          <a:lnRef idx="1">
+            <a:schemeClr val="accent1"/>
+          </a:lnRef>
+          <a:fillRef idx="3">
+            <a:schemeClr val="accent1"/>
+          </a:fillRef>
+          <a:effectRef idx="2">
+            <a:schemeClr val="accent1"/>
+          </a:effectRef>
+          <a:fontRef idx="minor">
+            <a:schemeClr val="lt1"/>
+          </a:fontRef>
+        </p:style>
+        <p:txBody>
+          <a:bodyPr wrap="square" rtlCol="0" anchor="ctr">
+            <a:noAutofit/>
+          </a:bodyPr>
+          <a:lstStyle/>
+          <a:p>
+            <a:pPr algn="ctr"/>
+            <a:endParaRPr lang="en-US"/>
+          </a:p>
+        </p:txBody>
+      </p:sp>
+      <p:sp>
+        <p:nvSpPr>
+          <p:cNvPr id="2" name="Titre 1">
+            <a:extLst>
+              <a:ext uri="{FF2B5EF4-FFF2-40B4-BE49-F238E27FC236}">
+                <a16:creationId xmlns:a16="http://schemas.microsoft.com/office/drawing/2014/main" id="{2A6488ED-9DB9-882F-9F29-6429F724BC4F}"/>
+              </a:ext>
+            </a:extLst>
+          </p:cNvPr>
+          <p:cNvSpPr>
+            <a:spLocks noGrp="1"/>
+          </p:cNvSpPr>
+          <p:nvPr>
+            <p:ph type="title"/>
+          </p:nvPr>
+        </p:nvSpPr>
+        <p:spPr>
+          <a:xfrm>
+            <a:off x="451514" y="1800225"/>
+            <a:ext cx="3444211" cy="4241136"/>
+          </a:xfrm>
+        </p:spPr>
+        <p:txBody>
+          <a:bodyPr vert="horz" lIns="91440" tIns="45720" rIns="91440" bIns="45720" rtlCol="0" anchor="t">
+            <a:normAutofit/>
+          </a:bodyPr>
+          <a:lstStyle/>
+          <a:p>
+            <a:r>
+              <a:rPr lang="en-US" sz="4400"/>
+              <a:t>Structure du projet</a:t>
+            </a:r>
+          </a:p>
+        </p:txBody>
+      </p:sp>
+      <p:pic>
+        <p:nvPicPr>
+          <p:cNvPr id="4" name="Espace réservé du contenu 3">
+            <a:extLst>
+              <a:ext uri="{FF2B5EF4-FFF2-40B4-BE49-F238E27FC236}">
+                <a16:creationId xmlns:a16="http://schemas.microsoft.com/office/drawing/2014/main" id="{8B2815A5-C61E-8904-276F-36B9DD5EF299}"/>
+              </a:ext>
+            </a:extLst>
+          </p:cNvPr>
+          <p:cNvPicPr>
+            <a:picLocks noGrp="1" noChangeAspect="1"/>
+          </p:cNvPicPr>
+          <p:nvPr>
+            <p:ph idx="1"/>
+          </p:nvPr>
+        </p:nvPicPr>
+        <p:blipFill>
+          <a:blip r:embed="rId4"/>
+          <a:stretch>
+            <a:fillRect/>
+          </a:stretch>
+        </p:blipFill>
+        <p:spPr>
+          <a:xfrm>
+            <a:off x="6259582" y="224657"/>
+            <a:ext cx="4309840" cy="6408685"/>
+          </a:xfrm>
+          <a:prstGeom prst="roundRect">
+            <a:avLst>
+              <a:gd name="adj" fmla="val 3876"/>
+            </a:avLst>
+          </a:prstGeom>
+          <a:ln>
+            <a:solidFill>
+              <a:schemeClr val="accent1"/>
+            </a:solidFill>
+          </a:ln>
+          <a:effectLst/>
+        </p:spPr>
+      </p:pic>
+    </p:spTree>
+    <p:extLst>
+      <p:ext uri="{BB962C8B-B14F-4D97-AF65-F5344CB8AC3E}">
+        <p14:creationId xmlns:p14="http://schemas.microsoft.com/office/powerpoint/2010/main" val="2498801049"/>
+      </p:ext>
+    </p:extLst>
+  </p:cSld>
+  <p:clrMapOvr>
+    <a:overrideClrMapping bg1="lt1" tx1="dk1" bg2="lt2" tx2="dk2" accent1="accent1" accent2="accent2" accent3="accent3" accent4="accent4" accent5="accent5" accent6="accent6" hlink="hlink" folHlink="folHlink"/>
+  </p:clrMapOvr>
+</p:sld>
+</file>
+
+<file path=ppt/slides/slide5.xml><?xml version="1.0" encoding="utf-8"?>
 <p:sld xmlns:a="http://schemas.openxmlformats.org/drawingml/2006/main" xmlns:r="http://schemas.openxmlformats.org/officeDocument/2006/relationships" xmlns:p="http://schemas.openxmlformats.org/presentationml/2006/main">
   <p:cSld>
     <p:bg>
@@ -9733,7 +10346,7 @@
 </p:sld>
 </file>
 
-<file path=ppt/slides/slide5.xml><?xml version="1.0" encoding="utf-8"?>
+<file path=ppt/slides/slide6.xml><?xml version="1.0" encoding="utf-8"?>
 <p:sld xmlns:a="http://schemas.openxmlformats.org/drawingml/2006/main" xmlns:r="http://schemas.openxmlformats.org/officeDocument/2006/relationships" xmlns:p="http://schemas.openxmlformats.org/presentationml/2006/main">
   <p:cSld>
     <p:spTree>

</xml_diff>